<commit_message>
Added chapter: Konzeption Minor Changes and Adaptions: Architekturentwurf 0.1, Theoretisches Vorgehen
</commit_message>
<xml_diff>
--- a/Dokumente/Kapitel/Architekturentwurf 0.1.pptx
+++ b/Dokumente/Kapitel/Architekturentwurf 0.1.pptx
@@ -105,6 +105,11 @@
       </a:defRPr>
     </a:lvl9pPr>
   </p:defaultTextStyle>
+  <p:extLst>
+    <p:ext uri="{EFAFB233-063F-42B5-8137-9DF3F51BA10A}">
+      <p15:sldGuideLst xmlns:p15="http://schemas.microsoft.com/office/powerpoint/2012/main"/>
+    </p:ext>
+  </p:extLst>
 </p:presentation>
 </file>
 
@@ -354,7 +359,7 @@
           <a:p>
             <a:fld id="{5901B1DA-D782-4703-AA88-FE98BA53B37C}" type="datetimeFigureOut">
               <a:rPr lang="de-DE" smtClean="0"/>
-              <a:t>02.03.2019</a:t>
+              <a:t>03.03.2019</a:t>
             </a:fld>
             <a:endParaRPr lang="de-DE" dirty="0"/>
           </a:p>
@@ -576,7 +581,7 @@
           <a:p>
             <a:fld id="{5901B1DA-D782-4703-AA88-FE98BA53B37C}" type="datetimeFigureOut">
               <a:rPr lang="de-DE" smtClean="0"/>
-              <a:t>02.03.2019</a:t>
+              <a:t>03.03.2019</a:t>
             </a:fld>
             <a:endParaRPr lang="de-DE" dirty="0"/>
           </a:p>
@@ -853,7 +858,7 @@
           <a:p>
             <a:fld id="{5901B1DA-D782-4703-AA88-FE98BA53B37C}" type="datetimeFigureOut">
               <a:rPr lang="de-DE" smtClean="0"/>
-              <a:t>02.03.2019</a:t>
+              <a:t>03.03.2019</a:t>
             </a:fld>
             <a:endParaRPr lang="de-DE" dirty="0"/>
           </a:p>
@@ -1033,7 +1038,7 @@
           <a:p>
             <a:fld id="{5901B1DA-D782-4703-AA88-FE98BA53B37C}" type="datetimeFigureOut">
               <a:rPr lang="de-DE" smtClean="0"/>
-              <a:t>02.03.2019</a:t>
+              <a:t>03.03.2019</a:t>
             </a:fld>
             <a:endParaRPr lang="de-DE" dirty="0"/>
           </a:p>
@@ -1392,7 +1397,7 @@
           <a:p>
             <a:fld id="{5901B1DA-D782-4703-AA88-FE98BA53B37C}" type="datetimeFigureOut">
               <a:rPr lang="de-DE" smtClean="0"/>
-              <a:t>02.03.2019</a:t>
+              <a:t>03.03.2019</a:t>
             </a:fld>
             <a:endParaRPr lang="de-DE" dirty="0"/>
           </a:p>
@@ -1682,7 +1687,7 @@
           <a:p>
             <a:fld id="{5901B1DA-D782-4703-AA88-FE98BA53B37C}" type="datetimeFigureOut">
               <a:rPr lang="de-DE" smtClean="0"/>
-              <a:t>02.03.2019</a:t>
+              <a:t>03.03.2019</a:t>
             </a:fld>
             <a:endParaRPr lang="de-DE" dirty="0"/>
           </a:p>
@@ -2109,7 +2114,7 @@
           <a:p>
             <a:fld id="{5901B1DA-D782-4703-AA88-FE98BA53B37C}" type="datetimeFigureOut">
               <a:rPr lang="de-DE" smtClean="0"/>
-              <a:t>02.03.2019</a:t>
+              <a:t>03.03.2019</a:t>
             </a:fld>
             <a:endParaRPr lang="de-DE" dirty="0"/>
           </a:p>
@@ -2227,7 +2232,7 @@
           <a:p>
             <a:fld id="{5901B1DA-D782-4703-AA88-FE98BA53B37C}" type="datetimeFigureOut">
               <a:rPr lang="de-DE" smtClean="0"/>
-              <a:t>02.03.2019</a:t>
+              <a:t>03.03.2019</a:t>
             </a:fld>
             <a:endParaRPr lang="de-DE" dirty="0"/>
           </a:p>
@@ -2322,7 +2327,7 @@
           <a:p>
             <a:fld id="{5901B1DA-D782-4703-AA88-FE98BA53B37C}" type="datetimeFigureOut">
               <a:rPr lang="de-DE" smtClean="0"/>
-              <a:t>02.03.2019</a:t>
+              <a:t>03.03.2019</a:t>
             </a:fld>
             <a:endParaRPr lang="de-DE" dirty="0"/>
           </a:p>
@@ -2605,7 +2610,7 @@
           <a:p>
             <a:fld id="{5901B1DA-D782-4703-AA88-FE98BA53B37C}" type="datetimeFigureOut">
               <a:rPr lang="de-DE" smtClean="0"/>
-              <a:t>02.03.2019</a:t>
+              <a:t>03.03.2019</a:t>
             </a:fld>
             <a:endParaRPr lang="de-DE" dirty="0"/>
           </a:p>
@@ -2972,7 +2977,7 @@
           <a:p>
             <a:fld id="{5901B1DA-D782-4703-AA88-FE98BA53B37C}" type="datetimeFigureOut">
               <a:rPr lang="de-DE" smtClean="0"/>
-              <a:t>02.03.2019</a:t>
+              <a:t>03.03.2019</a:t>
             </a:fld>
             <a:endParaRPr lang="de-DE" dirty="0"/>
           </a:p>
@@ -3402,7 +3407,7 @@
           <a:p>
             <a:fld id="{5901B1DA-D782-4703-AA88-FE98BA53B37C}" type="datetimeFigureOut">
               <a:rPr lang="de-DE" smtClean="0"/>
-              <a:t>02.03.2019</a:t>
+              <a:t>03.03.2019</a:t>
             </a:fld>
             <a:endParaRPr lang="de-DE" dirty="0"/>
           </a:p>
@@ -3914,7 +3919,7 @@
         </p:nvGrpSpPr>
         <p:grpSpPr>
           <a:xfrm>
-            <a:off x="1773764" y="2305050"/>
+            <a:off x="1841732" y="3556293"/>
             <a:ext cx="3574255" cy="2848809"/>
             <a:chOff x="1888064" y="1743075"/>
             <a:chExt cx="3574255" cy="2848809"/>
@@ -4407,7 +4412,7 @@
         </p:nvGrpSpPr>
         <p:grpSpPr>
           <a:xfrm>
-            <a:off x="6774390" y="3809584"/>
+            <a:off x="6842358" y="5060827"/>
             <a:ext cx="3574255" cy="1658184"/>
             <a:chOff x="1735665" y="4409242"/>
             <a:chExt cx="3574255" cy="1658184"/>
@@ -4654,7 +4659,7 @@
         </p:nvCxnSpPr>
         <p:spPr>
           <a:xfrm>
-            <a:off x="5231604" y="4638676"/>
+            <a:off x="5299572" y="5889919"/>
             <a:ext cx="1224624" cy="0"/>
           </a:xfrm>
           <a:prstGeom prst="straightConnector1">
@@ -4694,14 +4699,17 @@
         </p:nvSpPr>
         <p:spPr>
           <a:xfrm>
-            <a:off x="6456228" y="3809584"/>
+            <a:off x="6524196" y="5060827"/>
             <a:ext cx="318162" cy="1658184"/>
           </a:xfrm>
           <a:prstGeom prst="rect">
             <a:avLst/>
           </a:prstGeom>
           <a:solidFill>
-            <a:schemeClr val="accent1"/>
+            <a:schemeClr val="accent1">
+              <a:lumMod val="60000"/>
+              <a:lumOff val="40000"/>
+            </a:schemeClr>
           </a:solidFill>
           <a:ln w="12700">
             <a:solidFill>
@@ -4729,7 +4737,7 @@
           <a:bodyPr vert="horz" rtlCol="0" anchor="ctr"/>
           <a:lstStyle/>
           <a:p>
-            <a:pPr algn="ctr"/>
+            <a:pPr algn="r"/>
             <a:r>
               <a:rPr lang="de-DE" dirty="0">
                 <a:solidFill>
@@ -4741,6 +4749,265 @@
           </a:p>
         </p:txBody>
       </p:sp>
+      <p:grpSp>
+        <p:nvGrpSpPr>
+          <p:cNvPr id="20" name="Gruppieren 19">
+            <a:extLst>
+              <a:ext uri="{FF2B5EF4-FFF2-40B4-BE49-F238E27FC236}">
+                <a16:creationId xmlns:a16="http://schemas.microsoft.com/office/drawing/2014/main" id="{CB059E4C-B618-498F-89CB-2E813F5C812D}"/>
+              </a:ext>
+            </a:extLst>
+          </p:cNvPr>
+          <p:cNvGrpSpPr/>
+          <p:nvPr/>
+        </p:nvGrpSpPr>
+        <p:grpSpPr>
+          <a:xfrm>
+            <a:off x="1841732" y="1658544"/>
+            <a:ext cx="3574255" cy="1325984"/>
+            <a:chOff x="1888064" y="1759854"/>
+            <a:chExt cx="3574255" cy="1325984"/>
+          </a:xfrm>
+        </p:grpSpPr>
+        <p:sp>
+          <p:nvSpPr>
+            <p:cNvPr id="21" name="Rechteck 20">
+              <a:extLst>
+                <a:ext uri="{FF2B5EF4-FFF2-40B4-BE49-F238E27FC236}">
+                  <a16:creationId xmlns:a16="http://schemas.microsoft.com/office/drawing/2014/main" id="{7C0613CB-A2F7-4896-A1AF-BDF99B67F565}"/>
+                </a:ext>
+              </a:extLst>
+            </p:cNvPr>
+            <p:cNvSpPr/>
+            <p:nvPr/>
+          </p:nvSpPr>
+          <p:spPr>
+            <a:xfrm>
+              <a:off x="1888064" y="1759854"/>
+              <a:ext cx="3574255" cy="1325984"/>
+            </a:xfrm>
+            <a:prstGeom prst="rect">
+              <a:avLst/>
+            </a:prstGeom>
+            <a:solidFill>
+              <a:schemeClr val="accent1">
+                <a:lumMod val="40000"/>
+                <a:lumOff val="60000"/>
+              </a:schemeClr>
+            </a:solidFill>
+            <a:ln w="12700">
+              <a:solidFill>
+                <a:schemeClr val="accent1"/>
+              </a:solidFill>
+            </a:ln>
+          </p:spPr>
+          <p:style>
+            <a:lnRef idx="2">
+              <a:schemeClr val="accent1">
+                <a:shade val="50000"/>
+              </a:schemeClr>
+            </a:lnRef>
+            <a:fillRef idx="1">
+              <a:schemeClr val="accent1"/>
+            </a:fillRef>
+            <a:effectRef idx="0">
+              <a:schemeClr val="accent1"/>
+            </a:effectRef>
+            <a:fontRef idx="minor">
+              <a:schemeClr val="lt1"/>
+            </a:fontRef>
+          </p:style>
+          <p:txBody>
+            <a:bodyPr rtlCol="0" anchor="t"/>
+            <a:lstStyle/>
+            <a:p>
+              <a:pPr algn="ctr"/>
+              <a:r>
+                <a:rPr lang="de-DE" dirty="0">
+                  <a:solidFill>
+                    <a:schemeClr val="tx1"/>
+                  </a:solidFill>
+                </a:rPr>
+                <a:t>Steam VR</a:t>
+              </a:r>
+            </a:p>
+          </p:txBody>
+        </p:sp>
+        <p:grpSp>
+          <p:nvGrpSpPr>
+            <p:cNvPr id="22" name="Gruppieren 21">
+              <a:extLst>
+                <a:ext uri="{FF2B5EF4-FFF2-40B4-BE49-F238E27FC236}">
+                  <a16:creationId xmlns:a16="http://schemas.microsoft.com/office/drawing/2014/main" id="{70F8E0AE-F044-4725-99FD-FB4D79B77419}"/>
+                </a:ext>
+              </a:extLst>
+            </p:cNvPr>
+            <p:cNvGrpSpPr/>
+            <p:nvPr/>
+          </p:nvGrpSpPr>
+          <p:grpSpPr>
+            <a:xfrm>
+              <a:off x="2005934" y="2171700"/>
+              <a:ext cx="3338513" cy="778873"/>
+              <a:chOff x="1967834" y="1933575"/>
+              <a:chExt cx="3338513" cy="778873"/>
+            </a:xfrm>
+          </p:grpSpPr>
+          <p:sp>
+            <p:nvSpPr>
+              <p:cNvPr id="35" name="Rechteck 34">
+                <a:extLst>
+                  <a:ext uri="{FF2B5EF4-FFF2-40B4-BE49-F238E27FC236}">
+                    <a16:creationId xmlns:a16="http://schemas.microsoft.com/office/drawing/2014/main" id="{C9BDAF7F-AF22-48B2-AD6E-0FC96483176B}"/>
+                  </a:ext>
+                </a:extLst>
+              </p:cNvPr>
+              <p:cNvSpPr/>
+              <p:nvPr/>
+            </p:nvSpPr>
+            <p:spPr>
+              <a:xfrm>
+                <a:off x="1967834" y="1950449"/>
+                <a:ext cx="3338513" cy="761999"/>
+              </a:xfrm>
+              <a:prstGeom prst="rect">
+                <a:avLst/>
+              </a:prstGeom>
+              <a:solidFill>
+                <a:schemeClr val="accent1">
+                  <a:lumMod val="20000"/>
+                  <a:lumOff val="80000"/>
+                </a:schemeClr>
+              </a:solidFill>
+              <a:ln w="12700">
+                <a:solidFill>
+                  <a:schemeClr val="accent1"/>
+                </a:solidFill>
+              </a:ln>
+            </p:spPr>
+            <p:style>
+              <a:lnRef idx="2">
+                <a:schemeClr val="accent1">
+                  <a:shade val="50000"/>
+                </a:schemeClr>
+              </a:lnRef>
+              <a:fillRef idx="1">
+                <a:schemeClr val="accent1"/>
+              </a:fillRef>
+              <a:effectRef idx="0">
+                <a:schemeClr val="accent1"/>
+              </a:effectRef>
+              <a:fontRef idx="minor">
+                <a:schemeClr val="lt1"/>
+              </a:fontRef>
+            </p:style>
+            <p:txBody>
+              <a:bodyPr rtlCol="0" anchor="ctr"/>
+              <a:lstStyle/>
+              <a:p>
+                <a:pPr algn="ctr">
+                  <a:lnSpc>
+                    <a:spcPct val="250000"/>
+                  </a:lnSpc>
+                </a:pPr>
+                <a:r>
+                  <a:rPr lang="de-DE" dirty="0">
+                    <a:solidFill>
+                      <a:schemeClr val="tx1"/>
+                    </a:solidFill>
+                  </a:rPr>
+                  <a:t>HTC-Vive</a:t>
+                </a:r>
+              </a:p>
+            </p:txBody>
+          </p:sp>
+          <p:sp>
+            <p:nvSpPr>
+              <p:cNvPr id="36" name="Textfeld 35">
+                <a:extLst>
+                  <a:ext uri="{FF2B5EF4-FFF2-40B4-BE49-F238E27FC236}">
+                    <a16:creationId xmlns:a16="http://schemas.microsoft.com/office/drawing/2014/main" id="{67CF795D-51E3-40AD-AC22-D2024A91A0B0}"/>
+                  </a:ext>
+                </a:extLst>
+              </p:cNvPr>
+              <p:cNvSpPr txBox="1"/>
+              <p:nvPr/>
+            </p:nvSpPr>
+            <p:spPr>
+              <a:xfrm>
+                <a:off x="1969292" y="1933575"/>
+                <a:ext cx="1106265" cy="338554"/>
+              </a:xfrm>
+              <a:prstGeom prst="rect">
+                <a:avLst/>
+              </a:prstGeom>
+              <a:noFill/>
+            </p:spPr>
+            <p:txBody>
+              <a:bodyPr wrap="none" rtlCol="0">
+                <a:spAutoFit/>
+              </a:bodyPr>
+              <a:lstStyle/>
+              <a:p>
+                <a:r>
+                  <a:rPr lang="de-DE" sz="1600" dirty="0">
+                    <a:solidFill>
+                      <a:schemeClr val="bg1">
+                        <a:lumMod val="50000"/>
+                      </a:schemeClr>
+                    </a:solidFill>
+                  </a:rPr>
+                  <a:t>Client Tier</a:t>
+                </a:r>
+              </a:p>
+            </p:txBody>
+          </p:sp>
+        </p:grpSp>
+      </p:grpSp>
+      <p:cxnSp>
+        <p:nvCxnSpPr>
+          <p:cNvPr id="38" name="Gerade Verbindung mit Pfeil 37">
+            <a:extLst>
+              <a:ext uri="{FF2B5EF4-FFF2-40B4-BE49-F238E27FC236}">
+                <a16:creationId xmlns:a16="http://schemas.microsoft.com/office/drawing/2014/main" id="{92AB6C90-53B9-4393-AC18-D6080B40D11D}"/>
+              </a:ext>
+            </a:extLst>
+          </p:cNvPr>
+          <p:cNvCxnSpPr>
+            <a:cxnSpLocks/>
+            <a:stCxn id="21" idx="2"/>
+            <a:endCxn id="25" idx="0"/>
+          </p:cNvCxnSpPr>
+          <p:nvPr/>
+        </p:nvCxnSpPr>
+        <p:spPr>
+          <a:xfrm>
+            <a:off x="3628860" y="2984528"/>
+            <a:ext cx="0" cy="571765"/>
+          </a:xfrm>
+          <a:prstGeom prst="straightConnector1">
+            <a:avLst/>
+          </a:prstGeom>
+          <a:ln w="28575">
+            <a:headEnd type="triangle"/>
+            <a:tailEnd type="triangle"/>
+          </a:ln>
+        </p:spPr>
+        <p:style>
+          <a:lnRef idx="1">
+            <a:schemeClr val="accent1"/>
+          </a:lnRef>
+          <a:fillRef idx="0">
+            <a:schemeClr val="accent1"/>
+          </a:fillRef>
+          <a:effectRef idx="0">
+            <a:schemeClr val="accent1"/>
+          </a:effectRef>
+          <a:fontRef idx="minor">
+            <a:schemeClr val="tx1"/>
+          </a:fontRef>
+        </p:style>
+      </p:cxnSp>
     </p:spTree>
     <p:extLst>
       <p:ext uri="{BB962C8B-B14F-4D97-AF65-F5344CB8AC3E}">

</xml_diff>